<commit_message>
finished presentation, slight tweaks to pom
</commit_message>
<xml_diff>
--- a/presentation/bdd-presentation.pptx
+++ b/presentation/bdd-presentation.pptx
@@ -15,6 +15,11 @@
     <p:sldId id="263" r:id="rId9"/>
     <p:sldId id="264" r:id="rId10"/>
     <p:sldId id="265" r:id="rId11"/>
+    <p:sldId id="266" r:id="rId12"/>
+    <p:sldId id="267" r:id="rId13"/>
+    <p:sldId id="268" r:id="rId14"/>
+    <p:sldId id="269" r:id="rId15"/>
+    <p:sldId id="270" r:id="rId16"/>
   </p:sldIdLst>
   <p:sldSz cx="9144000" cy="6858000" type="screen4x3"/>
   <p:notesSz cx="6858000" cy="9144000"/>
@@ -1812,6 +1817,13 @@
         </dgm:presLayoutVars>
       </dgm:prSet>
       <dgm:spPr/>
+      <dgm:t>
+        <a:bodyPr/>
+        <a:lstStyle/>
+        <a:p>
+          <a:endParaRPr lang="en-US"/>
+        </a:p>
+      </dgm:t>
     </dgm:pt>
     <dgm:pt modelId="{21986AEF-710A-3642-9E7D-28D63E055E5B}" type="pres">
       <dgm:prSet presAssocID="{0287A39F-1B4C-D449-AD71-E27B55578F31}" presName="node" presStyleLbl="node1" presStyleIdx="0" presStyleCnt="4">
@@ -1831,10 +1843,24 @@
     <dgm:pt modelId="{AB626943-47C7-3042-A374-665012B0F0FC}" type="pres">
       <dgm:prSet presAssocID="{2EDA01AB-EB1F-0049-8563-7C28EDE996FB}" presName="sibTrans" presStyleLbl="sibTrans2D1" presStyleIdx="0" presStyleCnt="4"/>
       <dgm:spPr/>
+      <dgm:t>
+        <a:bodyPr/>
+        <a:lstStyle/>
+        <a:p>
+          <a:endParaRPr lang="en-US"/>
+        </a:p>
+      </dgm:t>
     </dgm:pt>
     <dgm:pt modelId="{7FB5AAC5-33B3-7145-8310-4B3A3973626D}" type="pres">
       <dgm:prSet presAssocID="{2EDA01AB-EB1F-0049-8563-7C28EDE996FB}" presName="connectorText" presStyleLbl="sibTrans2D1" presStyleIdx="0" presStyleCnt="4"/>
       <dgm:spPr/>
+      <dgm:t>
+        <a:bodyPr/>
+        <a:lstStyle/>
+        <a:p>
+          <a:endParaRPr lang="en-US"/>
+        </a:p>
+      </dgm:t>
     </dgm:pt>
     <dgm:pt modelId="{83EB15FC-BB69-3145-88CA-555A26220686}" type="pres">
       <dgm:prSet presAssocID="{C80B740F-4993-EE49-8145-42C6B92B3A8C}" presName="node" presStyleLbl="node1" presStyleIdx="1" presStyleCnt="4">
@@ -1843,14 +1869,35 @@
         </dgm:presLayoutVars>
       </dgm:prSet>
       <dgm:spPr/>
+      <dgm:t>
+        <a:bodyPr/>
+        <a:lstStyle/>
+        <a:p>
+          <a:endParaRPr lang="en-US"/>
+        </a:p>
+      </dgm:t>
     </dgm:pt>
     <dgm:pt modelId="{F05A2BC2-574C-3E46-9D83-64AF0940623F}" type="pres">
       <dgm:prSet presAssocID="{5A808DB9-69DF-FB43-8C4B-7C335C74091F}" presName="sibTrans" presStyleLbl="sibTrans2D1" presStyleIdx="1" presStyleCnt="4"/>
       <dgm:spPr/>
+      <dgm:t>
+        <a:bodyPr/>
+        <a:lstStyle/>
+        <a:p>
+          <a:endParaRPr lang="en-US"/>
+        </a:p>
+      </dgm:t>
     </dgm:pt>
     <dgm:pt modelId="{E128A292-3CEB-0A43-95D9-D0AEC358134B}" type="pres">
       <dgm:prSet presAssocID="{5A808DB9-69DF-FB43-8C4B-7C335C74091F}" presName="connectorText" presStyleLbl="sibTrans2D1" presStyleIdx="1" presStyleCnt="4"/>
       <dgm:spPr/>
+      <dgm:t>
+        <a:bodyPr/>
+        <a:lstStyle/>
+        <a:p>
+          <a:endParaRPr lang="en-US"/>
+        </a:p>
+      </dgm:t>
     </dgm:pt>
     <dgm:pt modelId="{642C60C6-771B-B447-9418-86D431AC79BB}" type="pres">
       <dgm:prSet presAssocID="{211A584C-1D4F-9246-A3F9-F11DFA95B4DD}" presName="node" presStyleLbl="node1" presStyleIdx="2" presStyleCnt="4">
@@ -1870,10 +1917,24 @@
     <dgm:pt modelId="{DAC65E58-53DC-2643-8EAA-17F77AB371ED}" type="pres">
       <dgm:prSet presAssocID="{0E75B704-51BA-004D-967E-8E5B6A8EE7B9}" presName="sibTrans" presStyleLbl="sibTrans2D1" presStyleIdx="2" presStyleCnt="4"/>
       <dgm:spPr/>
+      <dgm:t>
+        <a:bodyPr/>
+        <a:lstStyle/>
+        <a:p>
+          <a:endParaRPr lang="en-US"/>
+        </a:p>
+      </dgm:t>
     </dgm:pt>
     <dgm:pt modelId="{B7DCB2FC-4519-0541-ADFE-3A37418D77ED}" type="pres">
       <dgm:prSet presAssocID="{0E75B704-51BA-004D-967E-8E5B6A8EE7B9}" presName="connectorText" presStyleLbl="sibTrans2D1" presStyleIdx="2" presStyleCnt="4"/>
       <dgm:spPr/>
+      <dgm:t>
+        <a:bodyPr/>
+        <a:lstStyle/>
+        <a:p>
+          <a:endParaRPr lang="en-US"/>
+        </a:p>
+      </dgm:t>
     </dgm:pt>
     <dgm:pt modelId="{34801D83-604D-1A40-8294-D23A0856E785}" type="pres">
       <dgm:prSet presAssocID="{0E68C776-14FE-F24E-ACF9-3AFF9C382F69}" presName="node" presStyleLbl="node1" presStyleIdx="3" presStyleCnt="4">
@@ -1882,14 +1943,35 @@
         </dgm:presLayoutVars>
       </dgm:prSet>
       <dgm:spPr/>
+      <dgm:t>
+        <a:bodyPr/>
+        <a:lstStyle/>
+        <a:p>
+          <a:endParaRPr lang="en-US"/>
+        </a:p>
+      </dgm:t>
     </dgm:pt>
     <dgm:pt modelId="{B5310430-7C2D-A149-9AED-DA2FE3C78B14}" type="pres">
       <dgm:prSet presAssocID="{BBD8EA7A-85F6-BF49-96C9-6348A7577AED}" presName="sibTrans" presStyleLbl="sibTrans2D1" presStyleIdx="3" presStyleCnt="4"/>
       <dgm:spPr/>
+      <dgm:t>
+        <a:bodyPr/>
+        <a:lstStyle/>
+        <a:p>
+          <a:endParaRPr lang="en-US"/>
+        </a:p>
+      </dgm:t>
     </dgm:pt>
     <dgm:pt modelId="{3677C9B4-0907-D348-A67F-569E628D0E47}" type="pres">
       <dgm:prSet presAssocID="{BBD8EA7A-85F6-BF49-96C9-6348A7577AED}" presName="connectorText" presStyleLbl="sibTrans2D1" presStyleIdx="3" presStyleCnt="4"/>
       <dgm:spPr/>
+      <dgm:t>
+        <a:bodyPr/>
+        <a:lstStyle/>
+        <a:p>
+          <a:endParaRPr lang="en-US"/>
+        </a:p>
+      </dgm:t>
     </dgm:pt>
   </dgm:ptLst>
   <dgm:cxnLst>
@@ -2559,6 +2641,13 @@
         </dgm:presLayoutVars>
       </dgm:prSet>
       <dgm:spPr/>
+      <dgm:t>
+        <a:bodyPr/>
+        <a:lstStyle/>
+        <a:p>
+          <a:endParaRPr lang="en-US"/>
+        </a:p>
+      </dgm:t>
     </dgm:pt>
     <dgm:pt modelId="{DCF2AD02-D357-824D-9CD7-3F9A2F8A93D4}" type="pres">
       <dgm:prSet presAssocID="{8B8EE8C2-17B1-9341-9311-4B0BDAB17C13}" presName="parentLin" presStyleCnt="0"/>
@@ -2567,6 +2656,13 @@
     <dgm:pt modelId="{FAA2E603-AD7C-F14E-8A3F-DC6144C48C0F}" type="pres">
       <dgm:prSet presAssocID="{8B8EE8C2-17B1-9341-9311-4B0BDAB17C13}" presName="parentLeftMargin" presStyleLbl="node1" presStyleIdx="0" presStyleCnt="3"/>
       <dgm:spPr/>
+      <dgm:t>
+        <a:bodyPr/>
+        <a:lstStyle/>
+        <a:p>
+          <a:endParaRPr lang="en-US"/>
+        </a:p>
+      </dgm:t>
     </dgm:pt>
     <dgm:pt modelId="{5B229DD5-5EDD-EC4A-8670-B140997AE2B1}" type="pres">
       <dgm:prSet presAssocID="{8B8EE8C2-17B1-9341-9311-4B0BDAB17C13}" presName="parentText" presStyleLbl="node1" presStyleIdx="0" presStyleCnt="3">
@@ -2576,6 +2672,13 @@
         </dgm:presLayoutVars>
       </dgm:prSet>
       <dgm:spPr/>
+      <dgm:t>
+        <a:bodyPr/>
+        <a:lstStyle/>
+        <a:p>
+          <a:endParaRPr lang="en-US"/>
+        </a:p>
+      </dgm:t>
     </dgm:pt>
     <dgm:pt modelId="{542DAFB9-A5DE-9244-AE17-5F043E174703}" type="pres">
       <dgm:prSet presAssocID="{8B8EE8C2-17B1-9341-9311-4B0BDAB17C13}" presName="negativeSpace" presStyleCnt="0"/>
@@ -2607,6 +2710,13 @@
     <dgm:pt modelId="{C150F8BF-7C4D-D441-B85F-B87CD15A98EC}" type="pres">
       <dgm:prSet presAssocID="{B4CD674E-D35E-DF48-8C50-11F4F63E9085}" presName="parentLeftMargin" presStyleLbl="node1" presStyleIdx="0" presStyleCnt="3"/>
       <dgm:spPr/>
+      <dgm:t>
+        <a:bodyPr/>
+        <a:lstStyle/>
+        <a:p>
+          <a:endParaRPr lang="en-US"/>
+        </a:p>
+      </dgm:t>
     </dgm:pt>
     <dgm:pt modelId="{63D2F27D-A64A-7D4D-9FD2-F82664112C39}" type="pres">
       <dgm:prSet presAssocID="{B4CD674E-D35E-DF48-8C50-11F4F63E9085}" presName="parentText" presStyleLbl="node1" presStyleIdx="1" presStyleCnt="3">
@@ -2616,6 +2726,13 @@
         </dgm:presLayoutVars>
       </dgm:prSet>
       <dgm:spPr/>
+      <dgm:t>
+        <a:bodyPr/>
+        <a:lstStyle/>
+        <a:p>
+          <a:endParaRPr lang="en-US"/>
+        </a:p>
+      </dgm:t>
     </dgm:pt>
     <dgm:pt modelId="{1F710FA3-6FBC-4B42-AFD6-6ADB7983A9C3}" type="pres">
       <dgm:prSet presAssocID="{B4CD674E-D35E-DF48-8C50-11F4F63E9085}" presName="negativeSpace" presStyleCnt="0"/>
@@ -2647,6 +2764,13 @@
     <dgm:pt modelId="{4F69CB5A-4ADD-5940-94E8-BE1326D9E727}" type="pres">
       <dgm:prSet presAssocID="{B9A113F5-3AE7-154E-82F0-205268806D6B}" presName="parentLeftMargin" presStyleLbl="node1" presStyleIdx="1" presStyleCnt="3"/>
       <dgm:spPr/>
+      <dgm:t>
+        <a:bodyPr/>
+        <a:lstStyle/>
+        <a:p>
+          <a:endParaRPr lang="en-US"/>
+        </a:p>
+      </dgm:t>
     </dgm:pt>
     <dgm:pt modelId="{C7932AB8-2025-3444-99E1-DFA30463AA15}" type="pres">
       <dgm:prSet presAssocID="{B9A113F5-3AE7-154E-82F0-205268806D6B}" presName="parentText" presStyleLbl="node1" presStyleIdx="2" presStyleCnt="3">
@@ -2656,6 +2780,13 @@
         </dgm:presLayoutVars>
       </dgm:prSet>
       <dgm:spPr/>
+      <dgm:t>
+        <a:bodyPr/>
+        <a:lstStyle/>
+        <a:p>
+          <a:endParaRPr lang="en-US"/>
+        </a:p>
+      </dgm:t>
     </dgm:pt>
     <dgm:pt modelId="{2F756FAC-51B0-BD4C-BB98-E0B1FAA05E37}" type="pres">
       <dgm:prSet presAssocID="{B9A113F5-3AE7-154E-82F0-205268806D6B}" presName="negativeSpace" presStyleCnt="0"/>
@@ -2687,8 +2818,8 @@
     <dgm:cxn modelId="{6E616850-F7C6-714B-81D2-BEC61A0447F6}" srcId="{AA5B5489-5DE9-4E49-B690-1F21F12C9CA7}" destId="{B9A113F5-3AE7-154E-82F0-205268806D6B}" srcOrd="2" destOrd="0" parTransId="{014767FF-A2C6-FF4E-9F41-25B80B89C410}" sibTransId="{EA9D6F07-AE1C-8148-8DE8-214E1C28C6BC}"/>
     <dgm:cxn modelId="{BF1BCCDC-9673-B648-A1C5-CB36615B415F}" srcId="{B4CD674E-D35E-DF48-8C50-11F4F63E9085}" destId="{CA2303FC-66EF-6743-A783-ACD856EEF772}" srcOrd="0" destOrd="0" parTransId="{577E8F2B-2F9A-044F-826D-7ABDD7E0D2AF}" sibTransId="{981072C7-3BA2-F740-869A-E9B6D5D73586}"/>
     <dgm:cxn modelId="{3EAE6B00-8769-8741-85C9-A9C27C699627}" type="presOf" srcId="{CA2303FC-66EF-6743-A783-ACD856EEF772}" destId="{44D10FE2-219F-CE41-A9AF-0AF1D3C96A7D}" srcOrd="0" destOrd="0" presId="urn:microsoft.com/office/officeart/2005/8/layout/list1"/>
+    <dgm:cxn modelId="{67C20607-C2BB-1F41-9C23-23185A2D6583}" srcId="{8B8EE8C2-17B1-9341-9311-4B0BDAB17C13}" destId="{F8C93803-3036-EC4D-8067-9A5C7E51A78A}" srcOrd="0" destOrd="0" parTransId="{CD80B91B-6633-8F40-9936-DA599E6A12B6}" sibTransId="{311AC626-459D-014A-BA77-34E7418269C6}"/>
     <dgm:cxn modelId="{423F8464-CC88-294D-AC40-89BBBC9603B2}" type="presOf" srcId="{B4CD674E-D35E-DF48-8C50-11F4F63E9085}" destId="{63D2F27D-A64A-7D4D-9FD2-F82664112C39}" srcOrd="1" destOrd="0" presId="urn:microsoft.com/office/officeart/2005/8/layout/list1"/>
-    <dgm:cxn modelId="{67C20607-C2BB-1F41-9C23-23185A2D6583}" srcId="{8B8EE8C2-17B1-9341-9311-4B0BDAB17C13}" destId="{F8C93803-3036-EC4D-8067-9A5C7E51A78A}" srcOrd="0" destOrd="0" parTransId="{CD80B91B-6633-8F40-9936-DA599E6A12B6}" sibTransId="{311AC626-459D-014A-BA77-34E7418269C6}"/>
     <dgm:cxn modelId="{1114308F-A919-E14A-A045-7C3B47DCD773}" type="presOf" srcId="{8B8EE8C2-17B1-9341-9311-4B0BDAB17C13}" destId="{5B229DD5-5EDD-EC4A-8670-B140997AE2B1}" srcOrd="1" destOrd="0" presId="urn:microsoft.com/office/officeart/2005/8/layout/list1"/>
     <dgm:cxn modelId="{61BB9B4A-2DC2-2A46-8EAE-EC811DDCDA1B}" type="presOf" srcId="{569703E6-9AE8-124B-823B-C8ABD2904D66}" destId="{19021F60-33A6-EE47-9A27-97707F7BA2B5}" srcOrd="0" destOrd="0" presId="urn:microsoft.com/office/officeart/2005/8/layout/list1"/>
     <dgm:cxn modelId="{4D0FA5ED-881D-C84B-AD8A-2ACD151FF3A2}" type="presOf" srcId="{AA5B5489-5DE9-4E49-B690-1F21F12C9CA7}" destId="{35967E29-0843-1D4C-BE2B-50F25252A5B5}" srcOrd="0" destOrd="0" presId="urn:microsoft.com/office/officeart/2005/8/layout/list1"/>
@@ -7209,7 +7340,7 @@
           <a:p>
             <a:fld id="{03CEC41E-48BD-4881-B6FF-D82EEBBCD904}" type="datetimeFigureOut">
               <a:rPr lang="en-US" smtClean="0"/>
-              <a:t>12/11/13</a:t>
+              <a:t>12/12/13</a:t>
             </a:fld>
             <a:endParaRPr lang="en-US"/>
           </a:p>
@@ -7526,7 +7657,7 @@
           <a:p>
             <a:fld id="{03CEC41E-48BD-4881-B6FF-D82EEBBCD904}" type="datetimeFigureOut">
               <a:rPr lang="en-US" smtClean="0"/>
-              <a:t>12/11/13</a:t>
+              <a:t>12/12/13</a:t>
             </a:fld>
             <a:endParaRPr lang="en-US"/>
           </a:p>
@@ -7755,7 +7886,7 @@
           <a:p>
             <a:fld id="{03CEC41E-48BD-4881-B6FF-D82EEBBCD904}" type="datetimeFigureOut">
               <a:rPr lang="en-US" smtClean="0"/>
-              <a:t>12/11/13</a:t>
+              <a:t>12/12/13</a:t>
             </a:fld>
             <a:endParaRPr lang="en-US"/>
           </a:p>
@@ -8076,7 +8207,7 @@
           <a:p>
             <a:fld id="{03CEC41E-48BD-4881-B6FF-D82EEBBCD904}" type="datetimeFigureOut">
               <a:rPr lang="en-US" smtClean="0"/>
-              <a:t>12/11/13</a:t>
+              <a:t>12/12/13</a:t>
             </a:fld>
             <a:endParaRPr lang="en-US"/>
           </a:p>
@@ -8269,7 +8400,7 @@
           <a:p>
             <a:fld id="{03CEC41E-48BD-4881-B6FF-D82EEBBCD904}" type="datetimeFigureOut">
               <a:rPr lang="en-US" smtClean="0"/>
-              <a:t>12/11/13</a:t>
+              <a:t>12/12/13</a:t>
             </a:fld>
             <a:endParaRPr lang="en-US"/>
           </a:p>
@@ -8438,7 +8569,7 @@
           <a:p>
             <a:fld id="{03CEC41E-48BD-4881-B6FF-D82EEBBCD904}" type="datetimeFigureOut">
               <a:rPr lang="en-US" smtClean="0"/>
-              <a:t>12/11/13</a:t>
+              <a:t>12/12/13</a:t>
             </a:fld>
             <a:endParaRPr lang="en-US"/>
           </a:p>
@@ -8697,7 +8828,7 @@
           <a:p>
             <a:fld id="{03CEC41E-48BD-4881-B6FF-D82EEBBCD904}" type="datetimeFigureOut">
               <a:rPr lang="en-US" smtClean="0"/>
-              <a:t>12/11/13</a:t>
+              <a:t>12/12/13</a:t>
             </a:fld>
             <a:endParaRPr lang="en-US"/>
           </a:p>
@@ -9027,7 +9158,7 @@
           <a:p>
             <a:fld id="{03CEC41E-48BD-4881-B6FF-D82EEBBCD904}" type="datetimeFigureOut">
               <a:rPr lang="en-US" smtClean="0"/>
-              <a:t>12/11/13</a:t>
+              <a:t>12/12/13</a:t>
             </a:fld>
             <a:endParaRPr lang="en-US"/>
           </a:p>
@@ -9319,7 +9450,7 @@
           <a:p>
             <a:fld id="{03CEC41E-48BD-4881-B6FF-D82EEBBCD904}" type="datetimeFigureOut">
               <a:rPr lang="en-US" smtClean="0"/>
-              <a:t>12/11/13</a:t>
+              <a:t>12/12/13</a:t>
             </a:fld>
             <a:endParaRPr lang="en-US"/>
           </a:p>
@@ -9755,7 +9886,7 @@
           <a:p>
             <a:fld id="{03CEC41E-48BD-4881-B6FF-D82EEBBCD904}" type="datetimeFigureOut">
               <a:rPr lang="en-US" smtClean="0"/>
-              <a:t>12/11/13</a:t>
+              <a:t>12/12/13</a:t>
             </a:fld>
             <a:endParaRPr lang="en-US"/>
           </a:p>
@@ -9868,7 +9999,7 @@
           <a:p>
             <a:fld id="{03CEC41E-48BD-4881-B6FF-D82EEBBCD904}" type="datetimeFigureOut">
               <a:rPr lang="en-US" smtClean="0"/>
-              <a:t>12/11/13</a:t>
+              <a:t>12/12/13</a:t>
             </a:fld>
             <a:endParaRPr lang="en-US"/>
           </a:p>
@@ -9963,7 +10094,7 @@
           <a:p>
             <a:fld id="{03CEC41E-48BD-4881-B6FF-D82EEBBCD904}" type="datetimeFigureOut">
               <a:rPr lang="en-US" smtClean="0"/>
-              <a:t>12/11/13</a:t>
+              <a:t>12/12/13</a:t>
             </a:fld>
             <a:endParaRPr lang="en-US"/>
           </a:p>
@@ -10279,7 +10410,7 @@
           <a:p>
             <a:fld id="{03CEC41E-48BD-4881-B6FF-D82EEBBCD904}" type="datetimeFigureOut">
               <a:rPr lang="en-US" smtClean="0"/>
-              <a:t>12/11/13</a:t>
+              <a:t>12/12/13</a:t>
             </a:fld>
             <a:endParaRPr lang="en-US"/>
           </a:p>
@@ -10507,7 +10638,7 @@
           <a:p>
             <a:fld id="{03CEC41E-48BD-4881-B6FF-D82EEBBCD904}" type="datetimeFigureOut">
               <a:rPr lang="en-US" smtClean="0"/>
-              <a:t>12/11/13</a:t>
+              <a:t>12/12/13</a:t>
             </a:fld>
             <a:endParaRPr lang="en-US"/>
           </a:p>
@@ -11134,6 +11265,811 @@
 </p:sld>
 </file>
 
+<file path=ppt/slides/slide11.xml><?xml version="1.0" encoding="utf-8"?>
+<p:sld xmlns:a="http://schemas.openxmlformats.org/drawingml/2006/main" xmlns:r="http://schemas.openxmlformats.org/officeDocument/2006/relationships" xmlns:p="http://schemas.openxmlformats.org/presentationml/2006/main">
+  <p:cSld>
+    <p:spTree>
+      <p:nvGrpSpPr>
+        <p:cNvPr id="1" name=""/>
+        <p:cNvGrpSpPr/>
+        <p:nvPr/>
+      </p:nvGrpSpPr>
+      <p:grpSpPr>
+        <a:xfrm>
+          <a:off x="0" y="0"/>
+          <a:ext cx="0" cy="0"/>
+          <a:chOff x="0" y="0"/>
+          <a:chExt cx="0" cy="0"/>
+        </a:xfrm>
+      </p:grpSpPr>
+      <p:sp>
+        <p:nvSpPr>
+          <p:cNvPr id="5" name="Title 4"/>
+          <p:cNvSpPr>
+            <a:spLocks noGrp="1"/>
+          </p:cNvSpPr>
+          <p:nvPr>
+            <p:ph type="title"/>
+          </p:nvPr>
+        </p:nvSpPr>
+        <p:spPr/>
+        <p:txBody>
+          <a:bodyPr/>
+          <a:lstStyle/>
+          <a:p>
+            <a:r>
+              <a:rPr lang="en-US" dirty="0" smtClean="0"/>
+              <a:t>Running your stories – with </a:t>
+            </a:r>
+            <a:r>
+              <a:rPr lang="en-US" dirty="0" err="1" smtClean="0"/>
+              <a:t>jUnit</a:t>
+            </a:r>
+            <a:endParaRPr lang="en-US" dirty="0"/>
+          </a:p>
+        </p:txBody>
+      </p:sp>
+      <p:sp>
+        <p:nvSpPr>
+          <p:cNvPr id="6" name="Content Placeholder 5"/>
+          <p:cNvSpPr>
+            <a:spLocks noGrp="1"/>
+          </p:cNvSpPr>
+          <p:nvPr>
+            <p:ph idx="1"/>
+          </p:nvPr>
+        </p:nvSpPr>
+        <p:spPr/>
+        <p:txBody>
+          <a:bodyPr>
+            <a:normAutofit lnSpcReduction="10000"/>
+          </a:bodyPr>
+          <a:lstStyle/>
+          <a:p>
+            <a:r>
+              <a:rPr lang="en-US" dirty="0" smtClean="0"/>
+              <a:t>Create a class that extends </a:t>
+            </a:r>
+            <a:r>
+              <a:rPr lang="en-US" dirty="0" err="1" smtClean="0"/>
+              <a:t>JUnitStories</a:t>
+            </a:r>
+            <a:endParaRPr lang="en-US" dirty="0" smtClean="0"/>
+          </a:p>
+          <a:p>
+            <a:r>
+              <a:rPr lang="en-US" dirty="0" smtClean="0"/>
+              <a:t>Override the configuration() class.</a:t>
+            </a:r>
+          </a:p>
+          <a:p>
+            <a:pPr lvl="1"/>
+            <a:r>
+              <a:rPr lang="en-US" dirty="0" smtClean="0"/>
+              <a:t>Use </a:t>
+            </a:r>
+            <a:r>
+              <a:rPr lang="en-US" dirty="0" err="1" smtClean="0"/>
+              <a:t>MostUsefulConfiguration</a:t>
+            </a:r>
+            <a:endParaRPr lang="en-US" dirty="0" smtClean="0"/>
+          </a:p>
+          <a:p>
+            <a:pPr lvl="1"/>
+            <a:r>
+              <a:rPr lang="en-US" dirty="0" smtClean="0"/>
+              <a:t>Configure </a:t>
+            </a:r>
+            <a:r>
+              <a:rPr lang="en-US" dirty="0" err="1" smtClean="0"/>
+              <a:t>MostUsefulConfiguration</a:t>
+            </a:r>
+            <a:r>
+              <a:rPr lang="en-US" dirty="0" smtClean="0"/>
+              <a:t> to load from the </a:t>
+            </a:r>
+            <a:r>
+              <a:rPr lang="en-US" dirty="0" err="1" smtClean="0"/>
+              <a:t>classpath</a:t>
+            </a:r>
+            <a:r>
+              <a:rPr lang="en-US" dirty="0" smtClean="0"/>
+              <a:t>.</a:t>
+            </a:r>
+          </a:p>
+          <a:p>
+            <a:r>
+              <a:rPr lang="en-US" dirty="0" smtClean="0"/>
+              <a:t>Override the steps class to return a new </a:t>
+            </a:r>
+            <a:r>
+              <a:rPr lang="en-US" dirty="0" err="1" smtClean="0"/>
+              <a:t>InstanceStepsFactory</a:t>
+            </a:r>
+            <a:r>
+              <a:rPr lang="en-US" dirty="0" smtClean="0"/>
+              <a:t> with instances of your Step classes.</a:t>
+            </a:r>
+          </a:p>
+          <a:p>
+            <a:r>
+              <a:rPr lang="en-US" dirty="0" smtClean="0"/>
+              <a:t>Run it in your IDE like a normal </a:t>
+            </a:r>
+            <a:r>
+              <a:rPr lang="en-US" dirty="0" err="1" smtClean="0"/>
+              <a:t>jUnit</a:t>
+            </a:r>
+            <a:r>
+              <a:rPr lang="en-US" smtClean="0"/>
+              <a:t> test</a:t>
+            </a:r>
+            <a:endParaRPr lang="en-US" dirty="0" smtClean="0"/>
+          </a:p>
+        </p:txBody>
+      </p:sp>
+    </p:spTree>
+    <p:extLst>
+      <p:ext uri="{BB962C8B-B14F-4D97-AF65-F5344CB8AC3E}">
+        <p14:creationId xmlns:p14="http://schemas.microsoft.com/office/powerpoint/2010/main" val="1783255053"/>
+      </p:ext>
+    </p:extLst>
+  </p:cSld>
+  <p:clrMapOvr>
+    <a:masterClrMapping/>
+  </p:clrMapOvr>
+  <p:timing>
+    <p:tnLst>
+      <p:par>
+        <p:cTn xmlns:p14="http://schemas.microsoft.com/office/powerpoint/2010/main" id="1" dur="indefinite" restart="never" nodeType="tmRoot"/>
+      </p:par>
+    </p:tnLst>
+  </p:timing>
+</p:sld>
+</file>
+
+<file path=ppt/slides/slide12.xml><?xml version="1.0" encoding="utf-8"?>
+<p:sld xmlns:a="http://schemas.openxmlformats.org/drawingml/2006/main" xmlns:r="http://schemas.openxmlformats.org/officeDocument/2006/relationships" xmlns:p="http://schemas.openxmlformats.org/presentationml/2006/main">
+  <p:cSld>
+    <p:spTree>
+      <p:nvGrpSpPr>
+        <p:cNvPr id="1" name=""/>
+        <p:cNvGrpSpPr/>
+        <p:nvPr/>
+      </p:nvGrpSpPr>
+      <p:grpSpPr>
+        <a:xfrm>
+          <a:off x="0" y="0"/>
+          <a:ext cx="0" cy="0"/>
+          <a:chOff x="0" y="0"/>
+          <a:chExt cx="0" cy="0"/>
+        </a:xfrm>
+      </p:grpSpPr>
+      <p:sp>
+        <p:nvSpPr>
+          <p:cNvPr id="2" name="Title 1"/>
+          <p:cNvSpPr>
+            <a:spLocks noGrp="1"/>
+          </p:cNvSpPr>
+          <p:nvPr>
+            <p:ph type="title"/>
+          </p:nvPr>
+        </p:nvSpPr>
+        <p:spPr/>
+        <p:txBody>
+          <a:bodyPr/>
+          <a:lstStyle/>
+          <a:p>
+            <a:r>
+              <a:rPr lang="en-US" dirty="0" smtClean="0"/>
+              <a:t>Here’s what my basic Stories file looks like.</a:t>
+            </a:r>
+            <a:endParaRPr lang="en-US" dirty="0"/>
+          </a:p>
+        </p:txBody>
+      </p:sp>
+      <p:pic>
+        <p:nvPicPr>
+          <p:cNvPr id="5" name="Picture Placeholder 4" descr="Screen Shot 2013-12-12 at 9.16.20 AM.png"/>
+          <p:cNvPicPr>
+            <a:picLocks noGrp="1" noChangeAspect="1"/>
+          </p:cNvPicPr>
+          <p:nvPr>
+            <p:ph type="pic" idx="1"/>
+          </p:nvPr>
+        </p:nvPicPr>
+        <p:blipFill>
+          <a:blip r:embed="rId2">
+            <a:clrChange>
+              <a:clrFrom>
+                <a:srgbClr val="FBFBFB"/>
+              </a:clrFrom>
+              <a:clrTo>
+                <a:srgbClr val="FBFBFB">
+                  <a:alpha val="0"/>
+                </a:srgbClr>
+              </a:clrTo>
+            </a:clrChange>
+            <a:extLst>
+              <a:ext uri="{28A0092B-C50C-407E-A947-70E740481C1C}">
+                <a14:useLocalDpi xmlns:a14="http://schemas.microsoft.com/office/drawing/2010/main" val="0"/>
+              </a:ext>
+            </a:extLst>
+          </a:blip>
+          <a:srcRect l="-12150" r="-12150"/>
+          <a:stretch>
+            <a:fillRect/>
+          </a:stretch>
+        </p:blipFill>
+        <p:spPr/>
+      </p:pic>
+      <p:sp>
+        <p:nvSpPr>
+          <p:cNvPr id="4" name="Text Placeholder 3"/>
+          <p:cNvSpPr>
+            <a:spLocks noGrp="1"/>
+          </p:cNvSpPr>
+          <p:nvPr>
+            <p:ph type="body" sz="half" idx="2"/>
+          </p:nvPr>
+        </p:nvSpPr>
+        <p:spPr/>
+        <p:txBody>
+          <a:bodyPr/>
+          <a:lstStyle/>
+          <a:p>
+            <a:r>
+              <a:rPr lang="en-US" dirty="0" smtClean="0"/>
+              <a:t>It’s a lot to take in. Sorry.</a:t>
+            </a:r>
+            <a:endParaRPr lang="en-US" dirty="0"/>
+          </a:p>
+        </p:txBody>
+      </p:sp>
+    </p:spTree>
+    <p:extLst>
+      <p:ext uri="{BB962C8B-B14F-4D97-AF65-F5344CB8AC3E}">
+        <p14:creationId xmlns:p14="http://schemas.microsoft.com/office/powerpoint/2010/main" val="870304725"/>
+      </p:ext>
+    </p:extLst>
+  </p:cSld>
+  <p:clrMapOvr>
+    <a:masterClrMapping/>
+  </p:clrMapOvr>
+  <p:timing>
+    <p:tnLst>
+      <p:par>
+        <p:cTn xmlns:p14="http://schemas.microsoft.com/office/powerpoint/2010/main" id="1" dur="indefinite" restart="never" nodeType="tmRoot"/>
+      </p:par>
+    </p:tnLst>
+  </p:timing>
+</p:sld>
+</file>
+
+<file path=ppt/slides/slide13.xml><?xml version="1.0" encoding="utf-8"?>
+<p:sld xmlns:a="http://schemas.openxmlformats.org/drawingml/2006/main" xmlns:r="http://schemas.openxmlformats.org/officeDocument/2006/relationships" xmlns:p="http://schemas.openxmlformats.org/presentationml/2006/main">
+  <p:cSld>
+    <p:spTree>
+      <p:nvGrpSpPr>
+        <p:cNvPr id="1" name=""/>
+        <p:cNvGrpSpPr/>
+        <p:nvPr/>
+      </p:nvGrpSpPr>
+      <p:grpSpPr>
+        <a:xfrm>
+          <a:off x="0" y="0"/>
+          <a:ext cx="0" cy="0"/>
+          <a:chOff x="0" y="0"/>
+          <a:chExt cx="0" cy="0"/>
+        </a:xfrm>
+      </p:grpSpPr>
+      <p:sp>
+        <p:nvSpPr>
+          <p:cNvPr id="2" name="Title 1"/>
+          <p:cNvSpPr>
+            <a:spLocks noGrp="1"/>
+          </p:cNvSpPr>
+          <p:nvPr>
+            <p:ph type="title"/>
+          </p:nvPr>
+        </p:nvSpPr>
+        <p:spPr/>
+        <p:txBody>
+          <a:bodyPr/>
+          <a:lstStyle/>
+          <a:p>
+            <a:r>
+              <a:rPr lang="en-US" dirty="0" smtClean="0"/>
+              <a:t>CI Integration</a:t>
+            </a:r>
+            <a:endParaRPr lang="en-US" dirty="0"/>
+          </a:p>
+        </p:txBody>
+      </p:sp>
+      <p:sp>
+        <p:nvSpPr>
+          <p:cNvPr id="5" name="Content Placeholder 4"/>
+          <p:cNvSpPr>
+            <a:spLocks noGrp="1"/>
+          </p:cNvSpPr>
+          <p:nvPr>
+            <p:ph idx="1"/>
+          </p:nvPr>
+        </p:nvSpPr>
+        <p:spPr/>
+        <p:txBody>
+          <a:bodyPr/>
+          <a:lstStyle/>
+          <a:p>
+            <a:r>
+              <a:rPr lang="en-US" dirty="0" smtClean="0"/>
+              <a:t>Maven integration</a:t>
+            </a:r>
+          </a:p>
+          <a:p>
+            <a:pPr lvl="1"/>
+            <a:r>
+              <a:rPr lang="en-US" dirty="0" smtClean="0"/>
+              <a:t>Loads and runs  *</a:t>
+            </a:r>
+            <a:r>
+              <a:rPr lang="en-US" dirty="0" err="1" smtClean="0"/>
+              <a:t>Stories.class</a:t>
+            </a:r>
+            <a:r>
+              <a:rPr lang="en-US" dirty="0" smtClean="0"/>
+              <a:t> files</a:t>
+            </a:r>
+          </a:p>
+          <a:p>
+            <a:pPr lvl="1"/>
+            <a:r>
+              <a:rPr lang="en-US" dirty="0" smtClean="0"/>
+              <a:t>Generates a report</a:t>
+            </a:r>
+          </a:p>
+          <a:p>
+            <a:pPr lvl="1"/>
+            <a:r>
+              <a:rPr lang="en-US" dirty="0" smtClean="0"/>
+              <a:t>Does not integrate with the maven site plugin.</a:t>
+            </a:r>
+          </a:p>
+          <a:p>
+            <a:r>
+              <a:rPr lang="en-US" dirty="0" smtClean="0"/>
+              <a:t>Jenkins Integration</a:t>
+            </a:r>
+          </a:p>
+          <a:p>
+            <a:pPr lvl="1"/>
+            <a:r>
+              <a:rPr lang="en-US" dirty="0" smtClean="0"/>
+              <a:t>Make sure you install </a:t>
+            </a:r>
+            <a:r>
+              <a:rPr lang="en-US" dirty="0" err="1" smtClean="0"/>
+              <a:t>xUnit</a:t>
+            </a:r>
+            <a:r>
+              <a:rPr lang="en-US" dirty="0" smtClean="0"/>
+              <a:t> support and restart the server before installing the </a:t>
+            </a:r>
+            <a:r>
+              <a:rPr lang="en-US" dirty="0" err="1" smtClean="0"/>
+              <a:t>jBehave</a:t>
+            </a:r>
+            <a:r>
+              <a:rPr lang="en-US" dirty="0" smtClean="0"/>
+              <a:t> plugin.</a:t>
+            </a:r>
+          </a:p>
+          <a:p>
+            <a:pPr lvl="1"/>
+            <a:r>
+              <a:rPr lang="en-US" dirty="0"/>
+              <a:t>Use </a:t>
+            </a:r>
+            <a:r>
+              <a:rPr lang="en-US" dirty="0" smtClean="0"/>
+              <a:t>“*</a:t>
+            </a:r>
+            <a:r>
+              <a:rPr lang="en-US" dirty="0"/>
+              <a:t>*/</a:t>
+            </a:r>
+            <a:r>
+              <a:rPr lang="en-US" dirty="0" err="1"/>
+              <a:t>jbehave</a:t>
+            </a:r>
+            <a:r>
+              <a:rPr lang="en-US" dirty="0"/>
+              <a:t>/*.</a:t>
+            </a:r>
+            <a:r>
+              <a:rPr lang="en-US" dirty="0" smtClean="0"/>
+              <a:t>xml” unless you’re customizing things.</a:t>
+            </a:r>
+          </a:p>
+          <a:p>
+            <a:pPr marL="349250" lvl="1" indent="0">
+              <a:buNone/>
+            </a:pPr>
+            <a:endParaRPr lang="en-US" dirty="0"/>
+          </a:p>
+        </p:txBody>
+      </p:sp>
+    </p:spTree>
+    <p:extLst>
+      <p:ext uri="{BB962C8B-B14F-4D97-AF65-F5344CB8AC3E}">
+        <p14:creationId xmlns:p14="http://schemas.microsoft.com/office/powerpoint/2010/main" val="3693513677"/>
+      </p:ext>
+    </p:extLst>
+  </p:cSld>
+  <p:clrMapOvr>
+    <a:masterClrMapping/>
+  </p:clrMapOvr>
+</p:sld>
+</file>
+
+<file path=ppt/slides/slide14.xml><?xml version="1.0" encoding="utf-8"?>
+<p:sld xmlns:a="http://schemas.openxmlformats.org/drawingml/2006/main" xmlns:r="http://schemas.openxmlformats.org/officeDocument/2006/relationships" xmlns:p="http://schemas.openxmlformats.org/presentationml/2006/main">
+  <p:cSld>
+    <p:spTree>
+      <p:nvGrpSpPr>
+        <p:cNvPr id="1" name=""/>
+        <p:cNvGrpSpPr/>
+        <p:nvPr/>
+      </p:nvGrpSpPr>
+      <p:grpSpPr>
+        <a:xfrm>
+          <a:off x="0" y="0"/>
+          <a:ext cx="0" cy="0"/>
+          <a:chOff x="0" y="0"/>
+          <a:chExt cx="0" cy="0"/>
+        </a:xfrm>
+      </p:grpSpPr>
+      <p:sp>
+        <p:nvSpPr>
+          <p:cNvPr id="2" name="Title 1"/>
+          <p:cNvSpPr>
+            <a:spLocks noGrp="1"/>
+          </p:cNvSpPr>
+          <p:nvPr>
+            <p:ph type="title"/>
+          </p:nvPr>
+        </p:nvSpPr>
+        <p:spPr/>
+        <p:txBody>
+          <a:bodyPr/>
+          <a:lstStyle/>
+          <a:p>
+            <a:r>
+              <a:rPr lang="en-US" dirty="0" smtClean="0"/>
+              <a:t>Things I discovered</a:t>
+            </a:r>
+            <a:endParaRPr lang="en-US" dirty="0"/>
+          </a:p>
+        </p:txBody>
+      </p:sp>
+      <p:sp>
+        <p:nvSpPr>
+          <p:cNvPr id="3" name="Content Placeholder 2"/>
+          <p:cNvSpPr>
+            <a:spLocks noGrp="1"/>
+          </p:cNvSpPr>
+          <p:nvPr>
+            <p:ph idx="1"/>
+          </p:nvPr>
+        </p:nvSpPr>
+        <p:spPr/>
+        <p:txBody>
+          <a:bodyPr>
+            <a:normAutofit fontScale="92500"/>
+          </a:bodyPr>
+          <a:lstStyle/>
+          <a:p>
+            <a:r>
+              <a:rPr lang="en-US" dirty="0" err="1" smtClean="0"/>
+              <a:t>jBehave</a:t>
+            </a:r>
+            <a:r>
+              <a:rPr lang="en-US" dirty="0" smtClean="0"/>
+              <a:t> is still under active development, but…</a:t>
+            </a:r>
+          </a:p>
+          <a:p>
+            <a:r>
+              <a:rPr lang="en-US" dirty="0" smtClean="0"/>
+              <a:t>There is relatively little discussion of if in comparison to </a:t>
+            </a:r>
+          </a:p>
+          <a:p>
+            <a:pPr lvl="1"/>
+            <a:r>
+              <a:rPr lang="en-US" dirty="0" smtClean="0"/>
+              <a:t>cucumber/</a:t>
+            </a:r>
+            <a:r>
+              <a:rPr lang="en-US" dirty="0" err="1" smtClean="0"/>
+              <a:t>rSpec</a:t>
+            </a:r>
+            <a:r>
+              <a:rPr lang="en-US" dirty="0" smtClean="0"/>
+              <a:t> (ruby) </a:t>
+            </a:r>
+          </a:p>
+          <a:p>
+            <a:pPr lvl="1"/>
+            <a:r>
+              <a:rPr lang="en-US" dirty="0" smtClean="0"/>
+              <a:t>jasmine/vow (JavaScript)</a:t>
+            </a:r>
+          </a:p>
+          <a:p>
+            <a:pPr lvl="1"/>
+            <a:r>
+              <a:rPr lang="en-US" dirty="0" smtClean="0"/>
+              <a:t>lettuce/cucumber-</a:t>
+            </a:r>
+            <a:r>
+              <a:rPr lang="en-US" dirty="0" err="1" smtClean="0"/>
+              <a:t>py</a:t>
+            </a:r>
+            <a:r>
+              <a:rPr lang="en-US" dirty="0" smtClean="0"/>
+              <a:t> (python)</a:t>
+            </a:r>
+          </a:p>
+          <a:p>
+            <a:r>
+              <a:rPr lang="en-US" dirty="0" smtClean="0"/>
+              <a:t>Documentation is confusing, expect to go-it-alone.</a:t>
+            </a:r>
+          </a:p>
+          <a:p>
+            <a:pPr lvl="1"/>
+            <a:r>
+              <a:rPr lang="en-US" dirty="0" smtClean="0"/>
+              <a:t>The community is insular</a:t>
+            </a:r>
+          </a:p>
+          <a:p>
+            <a:pPr lvl="1"/>
+            <a:r>
+              <a:rPr lang="en-US" dirty="0" smtClean="0"/>
+              <a:t>No books that deal with </a:t>
+            </a:r>
+            <a:r>
+              <a:rPr lang="en-US" dirty="0" err="1" smtClean="0"/>
+              <a:t>jBehave</a:t>
+            </a:r>
+            <a:r>
+              <a:rPr lang="en-US" dirty="0" smtClean="0"/>
+              <a:t> specifically</a:t>
+            </a:r>
+          </a:p>
+          <a:p>
+            <a:r>
+              <a:rPr lang="en-US" dirty="0" smtClean="0"/>
+              <a:t>BDD is not popular amongst Java developers</a:t>
+            </a:r>
+          </a:p>
+          <a:p>
+            <a:pPr lvl="1"/>
+            <a:endParaRPr lang="en-US" dirty="0" smtClean="0"/>
+          </a:p>
+          <a:p>
+            <a:pPr marL="349250" lvl="1" indent="0">
+              <a:buNone/>
+            </a:pPr>
+            <a:endParaRPr lang="en-US" dirty="0" smtClean="0"/>
+          </a:p>
+        </p:txBody>
+      </p:sp>
+    </p:spTree>
+    <p:extLst>
+      <p:ext uri="{BB962C8B-B14F-4D97-AF65-F5344CB8AC3E}">
+        <p14:creationId xmlns:p14="http://schemas.microsoft.com/office/powerpoint/2010/main" val="3512921623"/>
+      </p:ext>
+    </p:extLst>
+  </p:cSld>
+  <p:clrMapOvr>
+    <a:masterClrMapping/>
+  </p:clrMapOvr>
+</p:sld>
+</file>
+
+<file path=ppt/slides/slide15.xml><?xml version="1.0" encoding="utf-8"?>
+<p:sld xmlns:a="http://schemas.openxmlformats.org/drawingml/2006/main" xmlns:r="http://schemas.openxmlformats.org/officeDocument/2006/relationships" xmlns:p="http://schemas.openxmlformats.org/presentationml/2006/main">
+  <p:cSld>
+    <p:spTree>
+      <p:nvGrpSpPr>
+        <p:cNvPr id="1" name=""/>
+        <p:cNvGrpSpPr/>
+        <p:nvPr/>
+      </p:nvGrpSpPr>
+      <p:grpSpPr>
+        <a:xfrm>
+          <a:off x="0" y="0"/>
+          <a:ext cx="0" cy="0"/>
+          <a:chOff x="0" y="0"/>
+          <a:chExt cx="0" cy="0"/>
+        </a:xfrm>
+      </p:grpSpPr>
+      <p:sp>
+        <p:nvSpPr>
+          <p:cNvPr id="2" name="Title 1"/>
+          <p:cNvSpPr>
+            <a:spLocks noGrp="1"/>
+          </p:cNvSpPr>
+          <p:nvPr>
+            <p:ph type="title"/>
+          </p:nvPr>
+        </p:nvSpPr>
+        <p:spPr/>
+        <p:txBody>
+          <a:bodyPr/>
+          <a:lstStyle/>
+          <a:p>
+            <a:r>
+              <a:rPr lang="en-US" dirty="0" smtClean="0"/>
+              <a:t>References</a:t>
+            </a:r>
+            <a:endParaRPr lang="en-US" dirty="0"/>
+          </a:p>
+        </p:txBody>
+      </p:sp>
+      <p:sp>
+        <p:nvSpPr>
+          <p:cNvPr id="3" name="Content Placeholder 2"/>
+          <p:cNvSpPr>
+            <a:spLocks noGrp="1"/>
+          </p:cNvSpPr>
+          <p:nvPr>
+            <p:ph idx="1"/>
+          </p:nvPr>
+        </p:nvSpPr>
+        <p:spPr/>
+        <p:txBody>
+          <a:bodyPr>
+            <a:normAutofit fontScale="92500" lnSpcReduction="10000"/>
+          </a:bodyPr>
+          <a:lstStyle/>
+          <a:p>
+            <a:r>
+              <a:rPr lang="en-US" dirty="0" smtClean="0"/>
+              <a:t>The </a:t>
+            </a:r>
+            <a:r>
+              <a:rPr lang="en-US" dirty="0" err="1" smtClean="0"/>
+              <a:t>jBehave</a:t>
+            </a:r>
+            <a:r>
+              <a:rPr lang="en-US" dirty="0" smtClean="0"/>
+              <a:t> main site</a:t>
+            </a:r>
+            <a:r>
+              <a:rPr lang="en-US" dirty="0"/>
+              <a:t>: </a:t>
+            </a:r>
+            <a:r>
+              <a:rPr lang="en-US" dirty="0">
+                <a:hlinkClick r:id="rId2"/>
+              </a:rPr>
+              <a:t>http://jbehave.org</a:t>
+            </a:r>
+            <a:r>
+              <a:rPr lang="en-US" dirty="0" smtClean="0">
+                <a:hlinkClick r:id="rId2"/>
+              </a:rPr>
+              <a:t>/</a:t>
+            </a:r>
+            <a:endParaRPr lang="en-US" dirty="0" smtClean="0"/>
+          </a:p>
+          <a:p>
+            <a:r>
+              <a:rPr lang="en-US" dirty="0" smtClean="0"/>
+              <a:t>Dan North’s </a:t>
+            </a:r>
+            <a:r>
+              <a:rPr lang="en-US" dirty="0"/>
+              <a:t>“Introducing BDD</a:t>
+            </a:r>
+            <a:r>
+              <a:rPr lang="en-US" dirty="0" smtClean="0"/>
+              <a:t>”: </a:t>
+            </a:r>
+            <a:r>
+              <a:rPr lang="en-US" dirty="0">
+                <a:hlinkClick r:id="rId3"/>
+              </a:rPr>
+              <a:t>http://dannorth.net/introducing-bdd</a:t>
+            </a:r>
+            <a:r>
+              <a:rPr lang="en-US" dirty="0" smtClean="0">
+                <a:hlinkClick r:id="rId3"/>
+              </a:rPr>
+              <a:t>/</a:t>
+            </a:r>
+            <a:endParaRPr lang="en-US" dirty="0" smtClean="0"/>
+          </a:p>
+          <a:p>
+            <a:r>
+              <a:rPr lang="en-US" dirty="0" smtClean="0"/>
+              <a:t>Daniel Solis’ game mechanic idea “Split Decision”: </a:t>
+            </a:r>
+            <a:r>
+              <a:rPr lang="en-US" dirty="0">
+                <a:hlinkClick r:id="rId4"/>
+              </a:rPr>
+              <a:t>http://danielsolisblog.blogspot.com/2010/10/split-</a:t>
+            </a:r>
+            <a:r>
+              <a:rPr lang="en-US" dirty="0" smtClean="0">
+                <a:hlinkClick r:id="rId4"/>
+              </a:rPr>
+              <a:t>decision.html</a:t>
+            </a:r>
+            <a:endParaRPr lang="en-US" dirty="0" smtClean="0"/>
+          </a:p>
+          <a:p>
+            <a:r>
+              <a:rPr lang="en-US" i="1" dirty="0" smtClean="0"/>
+              <a:t>The Cucumber Book: Behavior-Driven Development for Testers and Developers</a:t>
+            </a:r>
+            <a:r>
+              <a:rPr lang="en-US" dirty="0" smtClean="0"/>
+              <a:t> by Matt Wynne and </a:t>
+            </a:r>
+            <a:r>
+              <a:rPr lang="en-US" dirty="0" err="1" smtClean="0"/>
+              <a:t>Aslak</a:t>
+            </a:r>
+            <a:r>
+              <a:rPr lang="en-US" dirty="0" smtClean="0"/>
+              <a:t> </a:t>
+            </a:r>
+            <a:r>
+              <a:rPr lang="en-US" dirty="0" err="1" smtClean="0"/>
+              <a:t>Hellesøy</a:t>
+            </a:r>
+            <a:endParaRPr lang="en-US" dirty="0" smtClean="0"/>
+          </a:p>
+          <a:p>
+            <a:r>
+              <a:rPr lang="en-US" i="1" dirty="0" smtClean="0"/>
+              <a:t>The Clean Coder: A Code of Conduct for Professional Programmers</a:t>
+            </a:r>
+            <a:r>
+              <a:rPr lang="en-US" dirty="0" smtClean="0"/>
+              <a:t> by Robert C. Martin 	 </a:t>
+            </a:r>
+          </a:p>
+          <a:p>
+            <a:endParaRPr lang="en-US" dirty="0" smtClean="0"/>
+          </a:p>
+          <a:p>
+            <a:endParaRPr lang="en-US" dirty="0" smtClean="0"/>
+          </a:p>
+          <a:p>
+            <a:endParaRPr lang="en-US" dirty="0"/>
+          </a:p>
+        </p:txBody>
+      </p:sp>
+    </p:spTree>
+    <p:extLst>
+      <p:ext uri="{BB962C8B-B14F-4D97-AF65-F5344CB8AC3E}">
+        <p14:creationId xmlns:p14="http://schemas.microsoft.com/office/powerpoint/2010/main" val="2160696518"/>
+      </p:ext>
+    </p:extLst>
+  </p:cSld>
+  <p:clrMapOvr>
+    <a:masterClrMapping/>
+  </p:clrMapOvr>
+</p:sld>
+</file>
+
 <file path=ppt/slides/slide2.xml><?xml version="1.0" encoding="utf-8"?>
 <p:sld xmlns:a="http://schemas.openxmlformats.org/drawingml/2006/main" xmlns:r="http://schemas.openxmlformats.org/officeDocument/2006/relationships" xmlns:p="http://schemas.openxmlformats.org/presentationml/2006/main">
   <p:cSld>
@@ -11619,7 +12555,7 @@
                 <a:latin typeface="Inconsolata"/>
                 <a:cs typeface="Inconsolata"/>
               </a:rPr>
-              <a:t>Feature:</a:t>
+              <a:t>Story:</a:t>
             </a:r>
             <a:r>
               <a:rPr lang="en-US" dirty="0" smtClean="0">
@@ -11629,7 +12565,7 @@
                 <a:latin typeface="Inconsolata"/>
                 <a:cs typeface="Inconsolata"/>
               </a:rPr>
-              <a:t> (aka Story:)</a:t>
+              <a:t> (aka Feature:)</a:t>
             </a:r>
             <a:r>
               <a:rPr lang="en-US" dirty="0" smtClean="0">

</xml_diff>